<commit_message>
Modify prep.pptx and create prep.pdf
</commit_message>
<xml_diff>
--- a/submissions/phase2/prep.pptx
+++ b/submissions/phase2/prep.pptx
@@ -3960,8 +3960,8 @@
         </p:nvSpPr>
         <p:spPr>
           <a:xfrm>
-            <a:off x="988449" y="5016446"/>
-            <a:ext cx="7622151" cy="735714"/>
+            <a:off x="869591" y="5134979"/>
+            <a:ext cx="7622151" cy="1400512"/>
           </a:xfrm>
           <a:prstGeom prst="rect">
             <a:avLst/>
@@ -3991,18 +3991,14 @@
           <a:p>
             <a:r>
               <a:rPr lang="en-US" altLang="zh-CN" dirty="0"/>
-              <a:t>Some attribute pairs has a correlation </a:t>
-            </a:r>
-            <a:r>
-              <a:rPr lang="en-US" altLang="zh-CN"/>
-              <a:t>greater than 0.5.</a:t>
+              <a:t>Some attribute pairs has a correlation greater than 0.5. But no attribute pair has a correlation greater than 0.7 after the transformation. </a:t>
             </a:r>
             <a:endParaRPr lang="en-US" altLang="zh-CN" b="1" dirty="0"/>
           </a:p>
           <a:p>
             <a:r>
               <a:rPr lang="en-US" altLang="zh-CN" dirty="0"/>
-              <a:t>The VIFs of all attributes are below 5. </a:t>
+              <a:t>The VIFs of all attributes are below 5, indicating that attributes are moderately correlated. </a:t>
             </a:r>
           </a:p>
         </p:txBody>
@@ -4492,8 +4488,8 @@
         </p:nvSpPr>
         <p:spPr>
           <a:xfrm>
-            <a:off x="1230084" y="1495207"/>
-            <a:ext cx="9731831" cy="4724498"/>
+            <a:off x="1230084" y="1183515"/>
+            <a:ext cx="9731831" cy="5389296"/>
           </a:xfrm>
           <a:prstGeom prst="rect">
             <a:avLst/>
@@ -4702,11 +4698,27 @@
             </a:pPr>
             <a:r>
               <a:rPr lang="en-US" altLang="zh-CN" dirty="0"/>
-              <a:t>The second transformation is to perform data standardization. </a:t>
+              <a:t>The second transformation is to perform data standardization.</a:t>
             </a:r>
           </a:p>
           <a:p>
             <a:pPr marL="742950" lvl="1" indent="-285750">
+              <a:lnSpc>
+                <a:spcPct val="120000"/>
+              </a:lnSpc>
+              <a:buClr>
+                <a:srgbClr val="D41B2C"/>
+              </a:buClr>
+              <a:buFont typeface="Arial" panose="020B0604020202020204" pitchFamily="34" charset="0"/>
+              <a:buChar char="•"/>
+            </a:pPr>
+            <a:r>
+              <a:rPr lang="en-US" altLang="zh-CN" dirty="0"/>
+              <a:t>We choose standardization as the method to re-scale features so that values of each feature have zero-mean and unit-variance.</a:t>
+            </a:r>
+          </a:p>
+          <a:p>
+            <a:pPr marL="285750" indent="-285750">
               <a:lnSpc>
                 <a:spcPct val="120000"/>
               </a:lnSpc>
@@ -4718,7 +4730,23 @@
             </a:pPr>
             <a:r>
               <a:rPr lang="en-US" altLang="zh-CN" dirty="0"/>
-              <a:t>We choose standardization as the method to re-scale features so that values of each feature have zero-mean and unit-variance.</a:t>
+              <a:t>The third transformation is to target encoding for categorical data.</a:t>
+            </a:r>
+          </a:p>
+          <a:p>
+            <a:pPr marL="742950" lvl="1" indent="-285750">
+              <a:lnSpc>
+                <a:spcPct val="120000"/>
+              </a:lnSpc>
+              <a:buClr>
+                <a:srgbClr val="D41B2C"/>
+              </a:buClr>
+              <a:buFont typeface="Arial" panose="020B0604020202020204" pitchFamily="34" charset="0"/>
+              <a:buChar char="•"/>
+            </a:pPr>
+            <a:r>
+              <a:rPr lang="en-US" altLang="zh-CN" dirty="0"/>
+              <a:t>Target encoding is implemented to transform data into numerical values.</a:t>
             </a:r>
           </a:p>
         </p:txBody>
@@ -5539,8 +5567,8 @@
         </p:nvSpPr>
         <p:spPr>
           <a:xfrm>
-            <a:off x="781878" y="2658613"/>
-            <a:ext cx="10456736" cy="1400512"/>
+            <a:off x="781878" y="2174929"/>
+            <a:ext cx="10456736" cy="3062505"/>
           </a:xfrm>
           <a:prstGeom prst="rect">
             <a:avLst/>
@@ -5553,7 +5581,22 @@
           </a:bodyPr>
           <a:lstStyle/>
           <a:p>
-            <a:pPr marL="285750" indent="-285750">
+            <a:pPr>
+              <a:lnSpc>
+                <a:spcPct val="120000"/>
+              </a:lnSpc>
+              <a:buClr>
+                <a:srgbClr val="D41B2C"/>
+              </a:buClr>
+            </a:pPr>
+            <a:r>
+              <a:rPr lang="en-US" altLang="zh-CN" dirty="0"/>
+              <a:t>A pipeline of transformers is created to perform several important transformations listed below.</a:t>
+            </a:r>
+            <a:endParaRPr lang="en-US" altLang="zh-CN" b="1" dirty="0"/>
+          </a:p>
+          <a:p>
+            <a:pPr marL="742950" lvl="1" indent="-285750">
               <a:lnSpc>
                 <a:spcPct val="120000"/>
               </a:lnSpc>
@@ -5563,10 +5606,7 @@
               <a:buFont typeface="Wingdings" panose="05000000000000000000" pitchFamily="2" charset="2"/>
               <a:buChar char="n"/>
             </a:pPr>
-            <a:r>
-              <a:rPr lang="en-US" altLang="zh-CN" dirty="0"/>
-              <a:t>A pipeline of transformers is created to perform several important transformations listed below.</a:t>
-            </a:r>
+            <a:endParaRPr lang="en-US" altLang="zh-CN" b="1" dirty="0"/>
           </a:p>
           <a:p>
             <a:pPr marL="742950" lvl="1" indent="-285750">
@@ -5580,10 +5620,46 @@
               <a:buChar char="n"/>
             </a:pPr>
             <a:r>
-              <a:rPr lang="en-US" altLang="zh-CN" b="1" dirty="0" err="1"/>
-              <a:t>DropColumnsTransfomer</a:t>
-            </a:r>
-            <a:endParaRPr lang="en-US" altLang="zh-CN" b="1" dirty="0"/>
+              <a:rPr lang="en-US" altLang="zh-CN" b="1" dirty="0"/>
+              <a:t>Numerical attributes</a:t>
+            </a:r>
+          </a:p>
+          <a:p>
+            <a:pPr marL="1200150" lvl="2" indent="-285750">
+              <a:lnSpc>
+                <a:spcPct val="120000"/>
+              </a:lnSpc>
+              <a:buClr>
+                <a:srgbClr val="D41B2C"/>
+              </a:buClr>
+              <a:buFont typeface="Arial" panose="020B0604020202020204" pitchFamily="34" charset="0"/>
+              <a:buChar char="•"/>
+            </a:pPr>
+            <a:r>
+              <a:rPr lang="en-US" altLang="zh-CN" dirty="0" err="1"/>
+              <a:t>DropColumnsTransformer</a:t>
+            </a:r>
+            <a:endParaRPr lang="en-US" altLang="zh-CN" dirty="0"/>
+          </a:p>
+          <a:p>
+            <a:pPr marL="1200150" lvl="2" indent="-285750">
+              <a:lnSpc>
+                <a:spcPct val="120000"/>
+              </a:lnSpc>
+              <a:buClr>
+                <a:srgbClr val="D41B2C"/>
+              </a:buClr>
+              <a:buFont typeface="Arial" panose="020B0604020202020204" pitchFamily="34" charset="0"/>
+              <a:buChar char="•"/>
+            </a:pPr>
+            <a:r>
+              <a:rPr lang="en-US" altLang="zh-CN" dirty="0" err="1"/>
+              <a:t>StandardScaler</a:t>
+            </a:r>
+            <a:r>
+              <a:rPr lang="en-US" altLang="zh-CN" dirty="0"/>
+              <a:t>()</a:t>
+            </a:r>
           </a:p>
           <a:p>
             <a:pPr marL="742950" lvl="1" indent="-285750">
@@ -5597,30 +5673,63 @@
               <a:buChar char="n"/>
             </a:pPr>
             <a:r>
-              <a:rPr lang="en-US" altLang="zh-CN" b="1" dirty="0" err="1"/>
-              <a:t>TargetEncoder</a:t>
-            </a:r>
-            <a:endParaRPr lang="en-US" altLang="zh-CN" b="1" dirty="0"/>
-          </a:p>
-          <a:p>
-            <a:pPr marL="742950" lvl="1" indent="-285750">
+              <a:rPr lang="en-US" altLang="zh-CN" b="1" dirty="0"/>
+              <a:t>Categorical attributes</a:t>
+            </a:r>
+          </a:p>
+          <a:p>
+            <a:pPr marL="1200150" lvl="2" indent="-285750">
               <a:lnSpc>
                 <a:spcPct val="120000"/>
               </a:lnSpc>
               <a:buClr>
                 <a:srgbClr val="D41B2C"/>
               </a:buClr>
-              <a:buFont typeface="Wingdings" panose="05000000000000000000" pitchFamily="2" charset="2"/>
-              <a:buChar char="n"/>
+              <a:buFont typeface="Arial" panose="020B0604020202020204" pitchFamily="34" charset="0"/>
+              <a:buChar char="•"/>
             </a:pPr>
             <a:r>
-              <a:rPr lang="en-US" altLang="zh-CN" b="1" dirty="0" err="1"/>
+              <a:rPr lang="en-US" altLang="zh-CN" dirty="0" err="1"/>
+              <a:t>DropColumnsTransformer</a:t>
+            </a:r>
+            <a:endParaRPr lang="en-US" altLang="zh-CN" dirty="0"/>
+          </a:p>
+          <a:p>
+            <a:pPr marL="1200150" lvl="2" indent="-285750">
+              <a:lnSpc>
+                <a:spcPct val="120000"/>
+              </a:lnSpc>
+              <a:buClr>
+                <a:srgbClr val="D41B2C"/>
+              </a:buClr>
+              <a:buFont typeface="Arial" panose="020B0604020202020204" pitchFamily="34" charset="0"/>
+              <a:buChar char="•"/>
+            </a:pPr>
+            <a:r>
+              <a:rPr lang="en-US" altLang="zh-CN" dirty="0" err="1"/>
               <a:t>StandardScaler</a:t>
             </a:r>
             <a:r>
-              <a:rPr lang="en-US" altLang="zh-CN" b="1" dirty="0"/>
+              <a:rPr lang="en-US" altLang="zh-CN" dirty="0"/>
               <a:t>()</a:t>
             </a:r>
+          </a:p>
+          <a:p>
+            <a:pPr marL="1200150" lvl="2" indent="-285750">
+              <a:lnSpc>
+                <a:spcPct val="120000"/>
+              </a:lnSpc>
+              <a:buClr>
+                <a:srgbClr val="D41B2C"/>
+              </a:buClr>
+              <a:buFont typeface="Arial" panose="020B0604020202020204" pitchFamily="34" charset="0"/>
+              <a:buChar char="•"/>
+            </a:pPr>
+            <a:r>
+              <a:rPr lang="en-US" altLang="zh-CN" dirty="0" err="1"/>
+              <a:t>TargetEncoder</a:t>
+            </a:r>
+            <a:endParaRPr lang="en-US" altLang="zh-CN" dirty="0"/>
           </a:p>
         </p:txBody>
       </p:sp>
@@ -5931,8 +6040,8 @@
               <a:buClr>
                 <a:srgbClr val="D41B2C"/>
               </a:buClr>
-              <a:buFont typeface="Wingdings" panose="05000000000000000000" pitchFamily="2" charset="2"/>
-              <a:buChar char="n"/>
+              <a:buFont typeface="Arial" panose="020B0604020202020204" pitchFamily="34" charset="0"/>
+              <a:buChar char="•"/>
             </a:pPr>
             <a:r>
               <a:rPr lang="en-US" altLang="zh-CN" dirty="0"/>
@@ -6808,8 +6917,8 @@
         </p:nvSpPr>
         <p:spPr>
           <a:xfrm>
-            <a:off x="781878" y="5596901"/>
-            <a:ext cx="9811338" cy="1068113"/>
+            <a:off x="781877" y="5596901"/>
+            <a:ext cx="10234465" cy="1068113"/>
           </a:xfrm>
           <a:prstGeom prst="rect">
             <a:avLst/>
@@ -6839,15 +6948,14 @@
           <a:p>
             <a:r>
               <a:rPr lang="en-US" altLang="zh-CN" dirty="0"/>
-              <a:t>Outlier fraction values in most attributes are decreased after the transformation. </a:t>
+              <a:t>The difference (outlier fraction) between pre-transformed and post-transformed data is very small. </a:t>
             </a:r>
           </a:p>
           <a:p>
             <a:r>
               <a:rPr lang="en-US" altLang="zh-CN" dirty="0"/>
-              <a:t>No value or attribute is dropped in this step because of the large number of ‘outliers’ and the usefulness of these attributes.</a:t>
-            </a:r>
-            <a:endParaRPr lang="zh-CN" altLang="en-US" dirty="0"/>
+              <a:t>Because all attributes are categorical, the existence of numerous ‘outliers’ is reasonable. No modification on these data points is added. </a:t>
+            </a:r>
           </a:p>
         </p:txBody>
       </p:sp>

</xml_diff>